<commit_message>
Site updated: 2022-03-23 11:31:28
</commit_message>
<xml_diff>
--- a/2021/05/01/2021-05-01-predicting-stock-trend-using-lstm/stock.pptx
+++ b/2021/05/01/2021-05-01-predicting-stock-trend-using-lstm/stock.pptx
@@ -261,7 +261,7 @@
           <a:p>
             <a:fld id="{28C49C98-F37D-4AE4-9C0B-27C0FAFDB7F5}" type="datetimeFigureOut">
               <a:rPr lang="zh-TW" altLang="en-US" smtClean="0"/>
-              <a:t>2021/5/1</a:t>
+              <a:t>2022/1/1</a:t>
             </a:fld>
             <a:endParaRPr lang="zh-TW" altLang="en-US"/>
           </a:p>
@@ -459,7 +459,7 @@
           <a:p>
             <a:fld id="{28C49C98-F37D-4AE4-9C0B-27C0FAFDB7F5}" type="datetimeFigureOut">
               <a:rPr lang="zh-TW" altLang="en-US" smtClean="0"/>
-              <a:t>2021/5/1</a:t>
+              <a:t>2022/1/1</a:t>
             </a:fld>
             <a:endParaRPr lang="zh-TW" altLang="en-US"/>
           </a:p>
@@ -667,7 +667,7 @@
           <a:p>
             <a:fld id="{28C49C98-F37D-4AE4-9C0B-27C0FAFDB7F5}" type="datetimeFigureOut">
               <a:rPr lang="zh-TW" altLang="en-US" smtClean="0"/>
-              <a:t>2021/5/1</a:t>
+              <a:t>2022/1/1</a:t>
             </a:fld>
             <a:endParaRPr lang="zh-TW" altLang="en-US"/>
           </a:p>
@@ -865,7 +865,7 @@
           <a:p>
             <a:fld id="{28C49C98-F37D-4AE4-9C0B-27C0FAFDB7F5}" type="datetimeFigureOut">
               <a:rPr lang="zh-TW" altLang="en-US" smtClean="0"/>
-              <a:t>2021/5/1</a:t>
+              <a:t>2022/1/1</a:t>
             </a:fld>
             <a:endParaRPr lang="zh-TW" altLang="en-US"/>
           </a:p>
@@ -1140,7 +1140,7 @@
           <a:p>
             <a:fld id="{28C49C98-F37D-4AE4-9C0B-27C0FAFDB7F5}" type="datetimeFigureOut">
               <a:rPr lang="zh-TW" altLang="en-US" smtClean="0"/>
-              <a:t>2021/5/1</a:t>
+              <a:t>2022/1/1</a:t>
             </a:fld>
             <a:endParaRPr lang="zh-TW" altLang="en-US"/>
           </a:p>
@@ -1405,7 +1405,7 @@
           <a:p>
             <a:fld id="{28C49C98-F37D-4AE4-9C0B-27C0FAFDB7F5}" type="datetimeFigureOut">
               <a:rPr lang="zh-TW" altLang="en-US" smtClean="0"/>
-              <a:t>2021/5/1</a:t>
+              <a:t>2022/1/1</a:t>
             </a:fld>
             <a:endParaRPr lang="zh-TW" altLang="en-US"/>
           </a:p>
@@ -1817,7 +1817,7 @@
           <a:p>
             <a:fld id="{28C49C98-F37D-4AE4-9C0B-27C0FAFDB7F5}" type="datetimeFigureOut">
               <a:rPr lang="zh-TW" altLang="en-US" smtClean="0"/>
-              <a:t>2021/5/1</a:t>
+              <a:t>2022/1/1</a:t>
             </a:fld>
             <a:endParaRPr lang="zh-TW" altLang="en-US"/>
           </a:p>
@@ -1958,7 +1958,7 @@
           <a:p>
             <a:fld id="{28C49C98-F37D-4AE4-9C0B-27C0FAFDB7F5}" type="datetimeFigureOut">
               <a:rPr lang="zh-TW" altLang="en-US" smtClean="0"/>
-              <a:t>2021/5/1</a:t>
+              <a:t>2022/1/1</a:t>
             </a:fld>
             <a:endParaRPr lang="zh-TW" altLang="en-US"/>
           </a:p>
@@ -2071,7 +2071,7 @@
           <a:p>
             <a:fld id="{28C49C98-F37D-4AE4-9C0B-27C0FAFDB7F5}" type="datetimeFigureOut">
               <a:rPr lang="zh-TW" altLang="en-US" smtClean="0"/>
-              <a:t>2021/5/1</a:t>
+              <a:t>2022/1/1</a:t>
             </a:fld>
             <a:endParaRPr lang="zh-TW" altLang="en-US"/>
           </a:p>
@@ -2382,7 +2382,7 @@
           <a:p>
             <a:fld id="{28C49C98-F37D-4AE4-9C0B-27C0FAFDB7F5}" type="datetimeFigureOut">
               <a:rPr lang="zh-TW" altLang="en-US" smtClean="0"/>
-              <a:t>2021/5/1</a:t>
+              <a:t>2022/1/1</a:t>
             </a:fld>
             <a:endParaRPr lang="zh-TW" altLang="en-US"/>
           </a:p>
@@ -2670,7 +2670,7 @@
           <a:p>
             <a:fld id="{28C49C98-F37D-4AE4-9C0B-27C0FAFDB7F5}" type="datetimeFigureOut">
               <a:rPr lang="zh-TW" altLang="en-US" smtClean="0"/>
-              <a:t>2021/5/1</a:t>
+              <a:t>2022/1/1</a:t>
             </a:fld>
             <a:endParaRPr lang="zh-TW" altLang="en-US"/>
           </a:p>
@@ -2911,7 +2911,7 @@
           <a:p>
             <a:fld id="{28C49C98-F37D-4AE4-9C0B-27C0FAFDB7F5}" type="datetimeFigureOut">
               <a:rPr lang="zh-TW" altLang="en-US" smtClean="0"/>
-              <a:t>2021/5/1</a:t>
+              <a:t>2022/1/1</a:t>
             </a:fld>
             <a:endParaRPr lang="zh-TW" altLang="en-US"/>
           </a:p>
@@ -11103,7 +11103,7 @@
         </p:nvSpPr>
         <p:spPr>
           <a:xfrm>
-            <a:off x="9904045" y="2310313"/>
+            <a:off x="9904045" y="4800977"/>
             <a:ext cx="399394" cy="378372"/>
           </a:xfrm>
           <a:prstGeom prst="flowChartConnector">
@@ -11137,49 +11137,6 @@
           </a:p>
         </p:txBody>
       </p:sp>
-      <p:cxnSp>
-        <p:nvCxnSpPr>
-          <p:cNvPr id="199" name="直線單箭頭接點 198">
-            <a:extLst>
-              <a:ext uri="{FF2B5EF4-FFF2-40B4-BE49-F238E27FC236}">
-                <a16:creationId xmlns:a16="http://schemas.microsoft.com/office/drawing/2014/main" id="{497A8E1A-17BE-481C-8EE8-0CB21E162144}"/>
-              </a:ext>
-            </a:extLst>
-          </p:cNvPr>
-          <p:cNvCxnSpPr>
-            <a:cxnSpLocks/>
-            <a:stCxn id="197" idx="3"/>
-            <a:endCxn id="198" idx="2"/>
-          </p:cNvCxnSpPr>
-          <p:nvPr/>
-        </p:nvCxnSpPr>
-        <p:spPr>
-          <a:xfrm>
-            <a:off x="9609829" y="2499140"/>
-            <a:ext cx="294216" cy="359"/>
-          </a:xfrm>
-          <a:prstGeom prst="straightConnector1">
-            <a:avLst/>
-          </a:prstGeom>
-          <a:ln w="19050">
-            <a:tailEnd type="triangle"/>
-          </a:ln>
-        </p:spPr>
-        <p:style>
-          <a:lnRef idx="1">
-            <a:schemeClr val="dk1"/>
-          </a:lnRef>
-          <a:fillRef idx="0">
-            <a:schemeClr val="dk1"/>
-          </a:fillRef>
-          <a:effectRef idx="0">
-            <a:schemeClr val="dk1"/>
-          </a:effectRef>
-          <a:fontRef idx="minor">
-            <a:schemeClr val="tx1"/>
-          </a:fontRef>
-        </p:style>
-      </p:cxnSp>
       <p:cxnSp>
         <p:nvCxnSpPr>
           <p:cNvPr id="202" name="接點: 肘形 201">
@@ -11198,8 +11155,8 @@
         </p:nvCxnSpPr>
         <p:spPr>
           <a:xfrm flipV="1">
-            <a:off x="7101775" y="2688685"/>
-            <a:ext cx="3001967" cy="2824911"/>
+            <a:off x="7101775" y="5179349"/>
+            <a:ext cx="3001967" cy="334247"/>
           </a:xfrm>
           <a:prstGeom prst="bentConnector2">
             <a:avLst/>
@@ -11237,7 +11194,7 @@
         </p:nvSpPr>
         <p:spPr>
           <a:xfrm>
-            <a:off x="10654008" y="1628730"/>
+            <a:off x="10654008" y="4119387"/>
             <a:ext cx="492672" cy="457854"/>
           </a:xfrm>
           <a:prstGeom prst="ellipse">
@@ -11293,7 +11250,7 @@
         </p:nvSpPr>
         <p:spPr>
           <a:xfrm>
-            <a:off x="10748075" y="2637722"/>
+            <a:off x="10748075" y="5128379"/>
             <a:ext cx="461665" cy="251031"/>
           </a:xfrm>
           <a:prstGeom prst="rect">
@@ -11329,7 +11286,7 @@
         </p:nvSpPr>
         <p:spPr>
           <a:xfrm>
-            <a:off x="10526570" y="1540046"/>
+            <a:off x="10526570" y="4030703"/>
             <a:ext cx="798785" cy="1923393"/>
           </a:xfrm>
           <a:prstGeom prst="roundRect">
@@ -11383,7 +11340,7 @@
         </p:nvSpPr>
         <p:spPr>
           <a:xfrm>
-            <a:off x="10654008" y="2155330"/>
+            <a:off x="10654008" y="4645987"/>
             <a:ext cx="492672" cy="457854"/>
           </a:xfrm>
           <a:prstGeom prst="ellipse">
@@ -11439,7 +11396,7 @@
         </p:nvSpPr>
         <p:spPr>
           <a:xfrm>
-            <a:off x="10654008" y="2913291"/>
+            <a:off x="10654008" y="5403948"/>
             <a:ext cx="492672" cy="457854"/>
           </a:xfrm>
           <a:prstGeom prst="ellipse">
@@ -11495,7 +11452,7 @@
         </p:nvSpPr>
         <p:spPr>
           <a:xfrm>
-            <a:off x="10728307" y="1738120"/>
+            <a:off x="10728307" y="4228777"/>
             <a:ext cx="472565" cy="253916"/>
           </a:xfrm>
           <a:prstGeom prst="rect">
@@ -11539,7 +11496,7 @@
         </p:nvSpPr>
         <p:spPr>
           <a:xfrm>
-            <a:off x="10748075" y="2274725"/>
+            <a:off x="10748075" y="4765382"/>
             <a:ext cx="472565" cy="253916"/>
           </a:xfrm>
           <a:prstGeom prst="rect">
@@ -11583,7 +11540,7 @@
         </p:nvSpPr>
         <p:spPr>
           <a:xfrm>
-            <a:off x="10746761" y="3010963"/>
+            <a:off x="10746761" y="5501620"/>
             <a:ext cx="472565" cy="253916"/>
           </a:xfrm>
           <a:prstGeom prst="rect">
@@ -11627,7 +11584,7 @@
         </p:nvSpPr>
         <p:spPr>
           <a:xfrm rot="10800000">
-            <a:off x="11367334" y="1555487"/>
+            <a:off x="11367334" y="4046144"/>
             <a:ext cx="231226" cy="1923393"/>
           </a:xfrm>
           <a:prstGeom prst="leftBrace">
@@ -11671,7 +11628,7 @@
         </p:nvSpPr>
         <p:spPr>
           <a:xfrm>
-            <a:off x="11590668" y="2291203"/>
+            <a:off x="11590668" y="4781860"/>
             <a:ext cx="574196" cy="400110"/>
           </a:xfrm>
           <a:prstGeom prst="rect">
@@ -11711,8 +11668,8 @@
         </p:nvCxnSpPr>
         <p:spPr>
           <a:xfrm>
-            <a:off x="10303439" y="2499499"/>
-            <a:ext cx="223131" cy="2244"/>
+            <a:off x="10303439" y="4990163"/>
+            <a:ext cx="223131" cy="2237"/>
           </a:xfrm>
           <a:prstGeom prst="straightConnector1">
             <a:avLst/>
@@ -11736,6 +11693,564 @@
           </a:fontRef>
         </p:style>
       </p:cxnSp>
+      <p:cxnSp>
+        <p:nvCxnSpPr>
+          <p:cNvPr id="103" name="接點: 肘形 102">
+            <a:extLst>
+              <a:ext uri="{FF2B5EF4-FFF2-40B4-BE49-F238E27FC236}">
+                <a16:creationId xmlns:a16="http://schemas.microsoft.com/office/drawing/2014/main" id="{68DD7DAA-978C-480F-A452-7D82A35E036C}"/>
+              </a:ext>
+            </a:extLst>
+          </p:cNvPr>
+          <p:cNvCxnSpPr>
+            <a:cxnSpLocks/>
+            <a:stCxn id="197" idx="3"/>
+            <a:endCxn id="198" idx="0"/>
+          </p:cNvCxnSpPr>
+          <p:nvPr/>
+        </p:nvCxnSpPr>
+        <p:spPr>
+          <a:xfrm>
+            <a:off x="9609829" y="2499140"/>
+            <a:ext cx="493913" cy="2301837"/>
+          </a:xfrm>
+          <a:prstGeom prst="bentConnector2">
+            <a:avLst/>
+          </a:prstGeom>
+          <a:ln w="19050">
+            <a:tailEnd type="triangle"/>
+          </a:ln>
+        </p:spPr>
+        <p:style>
+          <a:lnRef idx="1">
+            <a:schemeClr val="dk1"/>
+          </a:lnRef>
+          <a:fillRef idx="0">
+            <a:schemeClr val="dk1"/>
+          </a:fillRef>
+          <a:effectRef idx="0">
+            <a:schemeClr val="dk1"/>
+          </a:effectRef>
+          <a:fontRef idx="minor">
+            <a:schemeClr val="tx1"/>
+          </a:fontRef>
+        </p:style>
+      </p:cxnSp>
+      <p:sp>
+        <p:nvSpPr>
+          <p:cNvPr id="109" name="橢圓 108">
+            <a:extLst>
+              <a:ext uri="{FF2B5EF4-FFF2-40B4-BE49-F238E27FC236}">
+                <a16:creationId xmlns:a16="http://schemas.microsoft.com/office/drawing/2014/main" id="{2F3B7602-62BA-4360-AD5F-426FDB7FA394}"/>
+              </a:ext>
+            </a:extLst>
+          </p:cNvPr>
+          <p:cNvSpPr/>
+          <p:nvPr/>
+        </p:nvSpPr>
+        <p:spPr>
+          <a:xfrm>
+            <a:off x="10654008" y="340932"/>
+            <a:ext cx="492672" cy="457854"/>
+          </a:xfrm>
+          <a:prstGeom prst="ellipse">
+            <a:avLst/>
+          </a:prstGeom>
+          <a:solidFill>
+            <a:schemeClr val="accent6">
+              <a:lumMod val="60000"/>
+              <a:lumOff val="40000"/>
+            </a:schemeClr>
+          </a:solidFill>
+        </p:spPr>
+        <p:style>
+          <a:lnRef idx="2">
+            <a:schemeClr val="accent6">
+              <a:shade val="50000"/>
+            </a:schemeClr>
+          </a:lnRef>
+          <a:fillRef idx="1">
+            <a:schemeClr val="accent6"/>
+          </a:fillRef>
+          <a:effectRef idx="0">
+            <a:schemeClr val="accent6"/>
+          </a:effectRef>
+          <a:fontRef idx="minor">
+            <a:schemeClr val="lt1"/>
+          </a:fontRef>
+        </p:style>
+        <p:txBody>
+          <a:bodyPr rtlCol="0" anchor="ctr"/>
+          <a:lstStyle/>
+          <a:p>
+            <a:pPr algn="ctr"/>
+            <a:endParaRPr lang="zh-TW" altLang="en-US" sz="1050" b="1" dirty="0">
+              <a:solidFill>
+                <a:schemeClr val="tx1"/>
+              </a:solidFill>
+            </a:endParaRPr>
+          </a:p>
+        </p:txBody>
+      </p:sp>
+      <p:sp>
+        <p:nvSpPr>
+          <p:cNvPr id="116" name="文字方塊 115">
+            <a:extLst>
+              <a:ext uri="{FF2B5EF4-FFF2-40B4-BE49-F238E27FC236}">
+                <a16:creationId xmlns:a16="http://schemas.microsoft.com/office/drawing/2014/main" id="{EC0CE745-FE8C-4AB5-9BF1-04F11D014B16}"/>
+              </a:ext>
+            </a:extLst>
+          </p:cNvPr>
+          <p:cNvSpPr txBox="1"/>
+          <p:nvPr/>
+        </p:nvSpPr>
+        <p:spPr>
+          <a:xfrm>
+            <a:off x="10748075" y="1349924"/>
+            <a:ext cx="461665" cy="251031"/>
+          </a:xfrm>
+          <a:prstGeom prst="rect">
+            <a:avLst/>
+          </a:prstGeom>
+          <a:noFill/>
+        </p:spPr>
+        <p:txBody>
+          <a:bodyPr vert="eaVert" wrap="none" rtlCol="0">
+            <a:spAutoFit/>
+          </a:bodyPr>
+          <a:lstStyle/>
+          <a:p>
+            <a:r>
+              <a:rPr lang="en-US" altLang="zh-TW" dirty="0"/>
+              <a:t>…</a:t>
+            </a:r>
+            <a:endParaRPr lang="zh-TW" altLang="en-US" dirty="0"/>
+          </a:p>
+        </p:txBody>
+      </p:sp>
+      <p:sp>
+        <p:nvSpPr>
+          <p:cNvPr id="117" name="矩形: 圓角 116">
+            <a:extLst>
+              <a:ext uri="{FF2B5EF4-FFF2-40B4-BE49-F238E27FC236}">
+                <a16:creationId xmlns:a16="http://schemas.microsoft.com/office/drawing/2014/main" id="{BC0C4798-A89E-4C8A-A0DA-9A39A104C0A8}"/>
+              </a:ext>
+            </a:extLst>
+          </p:cNvPr>
+          <p:cNvSpPr/>
+          <p:nvPr/>
+        </p:nvSpPr>
+        <p:spPr>
+          <a:xfrm>
+            <a:off x="10526570" y="252248"/>
+            <a:ext cx="798785" cy="1923393"/>
+          </a:xfrm>
+          <a:prstGeom prst="roundRect">
+            <a:avLst/>
+          </a:prstGeom>
+          <a:noFill/>
+          <a:ln w="28575" cap="flat" cmpd="sng" algn="ctr">
+            <a:solidFill>
+              <a:schemeClr val="dk1"/>
+            </a:solidFill>
+            <a:prstDash val="sysDash"/>
+            <a:round/>
+            <a:headEnd type="none" w="med" len="med"/>
+            <a:tailEnd type="none" w="med" len="med"/>
+          </a:ln>
+        </p:spPr>
+        <p:style>
+          <a:lnRef idx="0">
+            <a:scrgbClr r="0" g="0" b="0"/>
+          </a:lnRef>
+          <a:fillRef idx="0">
+            <a:scrgbClr r="0" g="0" b="0"/>
+          </a:fillRef>
+          <a:effectRef idx="0">
+            <a:scrgbClr r="0" g="0" b="0"/>
+          </a:effectRef>
+          <a:fontRef idx="minor">
+            <a:schemeClr val="dk1"/>
+          </a:fontRef>
+        </p:style>
+        <p:txBody>
+          <a:bodyPr rtlCol="0" anchor="ctr"/>
+          <a:lstStyle/>
+          <a:p>
+            <a:pPr algn="ctr"/>
+            <a:endParaRPr lang="zh-TW" altLang="en-US"/>
+          </a:p>
+        </p:txBody>
+      </p:sp>
+      <p:sp>
+        <p:nvSpPr>
+          <p:cNvPr id="118" name="橢圓 117">
+            <a:extLst>
+              <a:ext uri="{FF2B5EF4-FFF2-40B4-BE49-F238E27FC236}">
+                <a16:creationId xmlns:a16="http://schemas.microsoft.com/office/drawing/2014/main" id="{17A1748B-05B9-4627-8402-9AF1DE3832B0}"/>
+              </a:ext>
+            </a:extLst>
+          </p:cNvPr>
+          <p:cNvSpPr/>
+          <p:nvPr/>
+        </p:nvSpPr>
+        <p:spPr>
+          <a:xfrm>
+            <a:off x="10654008" y="867532"/>
+            <a:ext cx="492672" cy="457854"/>
+          </a:xfrm>
+          <a:prstGeom prst="ellipse">
+            <a:avLst/>
+          </a:prstGeom>
+          <a:solidFill>
+            <a:schemeClr val="accent6">
+              <a:lumMod val="60000"/>
+              <a:lumOff val="40000"/>
+            </a:schemeClr>
+          </a:solidFill>
+        </p:spPr>
+        <p:style>
+          <a:lnRef idx="2">
+            <a:schemeClr val="accent6">
+              <a:shade val="50000"/>
+            </a:schemeClr>
+          </a:lnRef>
+          <a:fillRef idx="1">
+            <a:schemeClr val="accent6"/>
+          </a:fillRef>
+          <a:effectRef idx="0">
+            <a:schemeClr val="accent6"/>
+          </a:effectRef>
+          <a:fontRef idx="minor">
+            <a:schemeClr val="lt1"/>
+          </a:fontRef>
+        </p:style>
+        <p:txBody>
+          <a:bodyPr rtlCol="0" anchor="ctr"/>
+          <a:lstStyle/>
+          <a:p>
+            <a:pPr algn="ctr"/>
+            <a:endParaRPr lang="zh-TW" altLang="en-US" sz="1050" b="1" dirty="0">
+              <a:solidFill>
+                <a:schemeClr val="tx1"/>
+              </a:solidFill>
+            </a:endParaRPr>
+          </a:p>
+        </p:txBody>
+      </p:sp>
+      <p:sp>
+        <p:nvSpPr>
+          <p:cNvPr id="134" name="橢圓 133">
+            <a:extLst>
+              <a:ext uri="{FF2B5EF4-FFF2-40B4-BE49-F238E27FC236}">
+                <a16:creationId xmlns:a16="http://schemas.microsoft.com/office/drawing/2014/main" id="{28CDA0CE-26A6-4629-BF2B-E7162F5B2F1C}"/>
+              </a:ext>
+            </a:extLst>
+          </p:cNvPr>
+          <p:cNvSpPr/>
+          <p:nvPr/>
+        </p:nvSpPr>
+        <p:spPr>
+          <a:xfrm>
+            <a:off x="10654008" y="1625493"/>
+            <a:ext cx="492672" cy="457854"/>
+          </a:xfrm>
+          <a:prstGeom prst="ellipse">
+            <a:avLst/>
+          </a:prstGeom>
+          <a:solidFill>
+            <a:schemeClr val="accent6">
+              <a:lumMod val="60000"/>
+              <a:lumOff val="40000"/>
+            </a:schemeClr>
+          </a:solidFill>
+        </p:spPr>
+        <p:style>
+          <a:lnRef idx="2">
+            <a:schemeClr val="accent6">
+              <a:shade val="50000"/>
+            </a:schemeClr>
+          </a:lnRef>
+          <a:fillRef idx="1">
+            <a:schemeClr val="accent6"/>
+          </a:fillRef>
+          <a:effectRef idx="0">
+            <a:schemeClr val="accent6"/>
+          </a:effectRef>
+          <a:fontRef idx="minor">
+            <a:schemeClr val="lt1"/>
+          </a:fontRef>
+        </p:style>
+        <p:txBody>
+          <a:bodyPr rtlCol="0" anchor="ctr"/>
+          <a:lstStyle/>
+          <a:p>
+            <a:pPr algn="ctr"/>
+            <a:endParaRPr lang="zh-TW" altLang="en-US" sz="1050" b="1" dirty="0">
+              <a:solidFill>
+                <a:schemeClr val="tx1"/>
+              </a:solidFill>
+            </a:endParaRPr>
+          </a:p>
+        </p:txBody>
+      </p:sp>
+      <p:sp>
+        <p:nvSpPr>
+          <p:cNvPr id="135" name="文字方塊 134">
+            <a:extLst>
+              <a:ext uri="{FF2B5EF4-FFF2-40B4-BE49-F238E27FC236}">
+                <a16:creationId xmlns:a16="http://schemas.microsoft.com/office/drawing/2014/main" id="{58F2DE6B-B464-460F-9C1F-420AFF6C42D2}"/>
+              </a:ext>
+            </a:extLst>
+          </p:cNvPr>
+          <p:cNvSpPr txBox="1"/>
+          <p:nvPr/>
+        </p:nvSpPr>
+        <p:spPr>
+          <a:xfrm>
+            <a:off x="10685015" y="447131"/>
+            <a:ext cx="472565" cy="253916"/>
+          </a:xfrm>
+          <a:prstGeom prst="rect">
+            <a:avLst/>
+          </a:prstGeom>
+          <a:noFill/>
+        </p:spPr>
+        <p:txBody>
+          <a:bodyPr wrap="square" rtlCol="0">
+            <a:spAutoFit/>
+          </a:bodyPr>
+          <a:lstStyle/>
+          <a:p>
+            <a:r>
+              <a:rPr lang="en-US" altLang="zh-TW" sz="1050" dirty="0">
+                <a:solidFill>
+                  <a:schemeClr val="bg1"/>
+                </a:solidFill>
+              </a:rPr>
+              <a:t>c(t)</a:t>
+            </a:r>
+            <a:endParaRPr lang="zh-TW" altLang="en-US" sz="1050" dirty="0">
+              <a:solidFill>
+                <a:schemeClr val="bg1"/>
+              </a:solidFill>
+            </a:endParaRPr>
+          </a:p>
+        </p:txBody>
+      </p:sp>
+      <p:sp>
+        <p:nvSpPr>
+          <p:cNvPr id="136" name="文字方塊 135">
+            <a:extLst>
+              <a:ext uri="{FF2B5EF4-FFF2-40B4-BE49-F238E27FC236}">
+                <a16:creationId xmlns:a16="http://schemas.microsoft.com/office/drawing/2014/main" id="{EA53AA49-CF68-4BEB-B12D-F4229EFD2D75}"/>
+              </a:ext>
+            </a:extLst>
+          </p:cNvPr>
+          <p:cNvSpPr txBox="1"/>
+          <p:nvPr/>
+        </p:nvSpPr>
+        <p:spPr>
+          <a:xfrm>
+            <a:off x="10701374" y="998269"/>
+            <a:ext cx="472565" cy="253916"/>
+          </a:xfrm>
+          <a:prstGeom prst="rect">
+            <a:avLst/>
+          </a:prstGeom>
+          <a:noFill/>
+        </p:spPr>
+        <p:txBody>
+          <a:bodyPr wrap="square" rtlCol="0">
+            <a:spAutoFit/>
+          </a:bodyPr>
+          <a:lstStyle/>
+          <a:p>
+            <a:r>
+              <a:rPr lang="en-US" altLang="zh-TW" sz="1050" dirty="0">
+                <a:solidFill>
+                  <a:schemeClr val="bg1"/>
+                </a:solidFill>
+              </a:rPr>
+              <a:t>c(t)</a:t>
+            </a:r>
+            <a:endParaRPr lang="zh-TW" altLang="en-US" sz="1050" dirty="0">
+              <a:solidFill>
+                <a:schemeClr val="bg1"/>
+              </a:solidFill>
+            </a:endParaRPr>
+          </a:p>
+        </p:txBody>
+      </p:sp>
+      <p:sp>
+        <p:nvSpPr>
+          <p:cNvPr id="137" name="文字方塊 136">
+            <a:extLst>
+              <a:ext uri="{FF2B5EF4-FFF2-40B4-BE49-F238E27FC236}">
+                <a16:creationId xmlns:a16="http://schemas.microsoft.com/office/drawing/2014/main" id="{E7C1A094-CDFB-454C-8D9E-DA325D858392}"/>
+              </a:ext>
+            </a:extLst>
+          </p:cNvPr>
+          <p:cNvSpPr txBox="1"/>
+          <p:nvPr/>
+        </p:nvSpPr>
+        <p:spPr>
+          <a:xfrm>
+            <a:off x="10693621" y="1744602"/>
+            <a:ext cx="472565" cy="253916"/>
+          </a:xfrm>
+          <a:prstGeom prst="rect">
+            <a:avLst/>
+          </a:prstGeom>
+          <a:noFill/>
+        </p:spPr>
+        <p:txBody>
+          <a:bodyPr wrap="square" rtlCol="0">
+            <a:spAutoFit/>
+          </a:bodyPr>
+          <a:lstStyle/>
+          <a:p>
+            <a:r>
+              <a:rPr lang="en-US" altLang="zh-TW" sz="1050" dirty="0">
+                <a:solidFill>
+                  <a:schemeClr val="bg1"/>
+                </a:solidFill>
+              </a:rPr>
+              <a:t>c(t)</a:t>
+            </a:r>
+            <a:endParaRPr lang="zh-TW" altLang="en-US" sz="1050" dirty="0">
+              <a:solidFill>
+                <a:schemeClr val="bg1"/>
+              </a:solidFill>
+            </a:endParaRPr>
+          </a:p>
+        </p:txBody>
+      </p:sp>
+      <p:cxnSp>
+        <p:nvCxnSpPr>
+          <p:cNvPr id="138" name="接點: 肘形 137">
+            <a:extLst>
+              <a:ext uri="{FF2B5EF4-FFF2-40B4-BE49-F238E27FC236}">
+                <a16:creationId xmlns:a16="http://schemas.microsoft.com/office/drawing/2014/main" id="{3386DAF3-396E-42FE-AFC7-CE99A9100397}"/>
+              </a:ext>
+            </a:extLst>
+          </p:cNvPr>
+          <p:cNvCxnSpPr>
+            <a:cxnSpLocks/>
+            <a:stCxn id="178" idx="6"/>
+            <a:endCxn id="117" idx="1"/>
+          </p:cNvCxnSpPr>
+          <p:nvPr/>
+        </p:nvCxnSpPr>
+        <p:spPr>
+          <a:xfrm flipV="1">
+            <a:off x="7250195" y="1213945"/>
+            <a:ext cx="3276375" cy="1296064"/>
+          </a:xfrm>
+          <a:prstGeom prst="bentConnector3">
+            <a:avLst>
+              <a:gd name="adj1" fmla="val 8801"/>
+            </a:avLst>
+          </a:prstGeom>
+          <a:ln w="19050">
+            <a:tailEnd type="triangle"/>
+          </a:ln>
+        </p:spPr>
+        <p:style>
+          <a:lnRef idx="1">
+            <a:schemeClr val="dk1"/>
+          </a:lnRef>
+          <a:fillRef idx="0">
+            <a:schemeClr val="dk1"/>
+          </a:fillRef>
+          <a:effectRef idx="0">
+            <a:schemeClr val="dk1"/>
+          </a:effectRef>
+          <a:fontRef idx="minor">
+            <a:schemeClr val="tx1"/>
+          </a:fontRef>
+        </p:style>
+      </p:cxnSp>
+      <p:sp>
+        <p:nvSpPr>
+          <p:cNvPr id="139" name="左大括弧 138">
+            <a:extLst>
+              <a:ext uri="{FF2B5EF4-FFF2-40B4-BE49-F238E27FC236}">
+                <a16:creationId xmlns:a16="http://schemas.microsoft.com/office/drawing/2014/main" id="{663AC273-59C7-40FA-AE29-A91747F3F3AD}"/>
+              </a:ext>
+            </a:extLst>
+          </p:cNvPr>
+          <p:cNvSpPr/>
+          <p:nvPr/>
+        </p:nvSpPr>
+        <p:spPr>
+          <a:xfrm rot="10800000">
+            <a:off x="11372721" y="252887"/>
+            <a:ext cx="231226" cy="1923393"/>
+          </a:xfrm>
+          <a:prstGeom prst="leftBrace">
+            <a:avLst/>
+          </a:prstGeom>
+        </p:spPr>
+        <p:style>
+          <a:lnRef idx="1">
+            <a:schemeClr val="dk1"/>
+          </a:lnRef>
+          <a:fillRef idx="0">
+            <a:schemeClr val="dk1"/>
+          </a:fillRef>
+          <a:effectRef idx="0">
+            <a:schemeClr val="dk1"/>
+          </a:effectRef>
+          <a:fontRef idx="minor">
+            <a:schemeClr val="tx1"/>
+          </a:fontRef>
+        </p:style>
+        <p:txBody>
+          <a:bodyPr rtlCol="0" anchor="ctr"/>
+          <a:lstStyle/>
+          <a:p>
+            <a:pPr algn="ctr"/>
+            <a:endParaRPr lang="zh-TW" altLang="en-US"/>
+          </a:p>
+        </p:txBody>
+      </p:sp>
+      <p:sp>
+        <p:nvSpPr>
+          <p:cNvPr id="140" name="文字方塊 139">
+            <a:extLst>
+              <a:ext uri="{FF2B5EF4-FFF2-40B4-BE49-F238E27FC236}">
+                <a16:creationId xmlns:a16="http://schemas.microsoft.com/office/drawing/2014/main" id="{67E8F35B-4DF7-4610-8038-51CEA68740D9}"/>
+              </a:ext>
+            </a:extLst>
+          </p:cNvPr>
+          <p:cNvSpPr txBox="1"/>
+          <p:nvPr/>
+        </p:nvSpPr>
+        <p:spPr>
+          <a:xfrm>
+            <a:off x="11596055" y="988603"/>
+            <a:ext cx="574196" cy="400110"/>
+          </a:xfrm>
+          <a:prstGeom prst="rect">
+            <a:avLst/>
+          </a:prstGeom>
+          <a:noFill/>
+        </p:spPr>
+        <p:txBody>
+          <a:bodyPr wrap="none" rtlCol="0">
+            <a:spAutoFit/>
+          </a:bodyPr>
+          <a:lstStyle/>
+          <a:p>
+            <a:r>
+              <a:rPr lang="en-US" altLang="zh-TW" sz="2000" dirty="0"/>
+              <a:t>128</a:t>
+            </a:r>
+            <a:endParaRPr lang="zh-TW" altLang="en-US" sz="2000" dirty="0"/>
+          </a:p>
+        </p:txBody>
+      </p:sp>
     </p:spTree>
     <p:extLst>
       <p:ext uri="{BB962C8B-B14F-4D97-AF65-F5344CB8AC3E}">

</xml_diff>